<commit_message>
ejercicos consultas parte 1 clase día 6 - sesión 3
</commit_message>
<xml_diff>
--- a/d5/m5_26-09-2024_clase_58_dia_5-s3.pptx
+++ b/d5/m5_26-09-2024_clase_58_dia_5-s3.pptx
@@ -465,7 +465,7 @@
           <a:p>
             <a:fld id="{1F7D5737-F21B-45FB-B5CD-199FB62EBD15}" type="datetimeFigureOut">
               <a:rPr lang="es-CL" smtClean="0"/>
-              <a:t>26-09-2024</a:t>
+              <a:t>27-09-2024</a:t>
             </a:fld>
             <a:endParaRPr lang="es-CL"/>
           </a:p>
@@ -789,7 +789,7 @@
           <a:p>
             <a:fld id="{1F7D5737-F21B-45FB-B5CD-199FB62EBD15}" type="datetimeFigureOut">
               <a:rPr lang="es-CL" smtClean="0"/>
-              <a:t>26-09-2024</a:t>
+              <a:t>27-09-2024</a:t>
             </a:fld>
             <a:endParaRPr lang="es-CL"/>
           </a:p>
@@ -1037,7 +1037,7 @@
           <a:p>
             <a:fld id="{1F7D5737-F21B-45FB-B5CD-199FB62EBD15}" type="datetimeFigureOut">
               <a:rPr lang="es-CL" smtClean="0"/>
-              <a:t>26-09-2024</a:t>
+              <a:t>27-09-2024</a:t>
             </a:fld>
             <a:endParaRPr lang="es-CL"/>
           </a:p>
@@ -1376,7 +1376,7 @@
           <a:p>
             <a:fld id="{1F7D5737-F21B-45FB-B5CD-199FB62EBD15}" type="datetimeFigureOut">
               <a:rPr lang="es-CL" smtClean="0"/>
-              <a:t>26-09-2024</a:t>
+              <a:t>27-09-2024</a:t>
             </a:fld>
             <a:endParaRPr lang="es-CL"/>
           </a:p>
@@ -1723,7 +1723,7 @@
           <a:p>
             <a:fld id="{1F7D5737-F21B-45FB-B5CD-199FB62EBD15}" type="datetimeFigureOut">
               <a:rPr lang="es-CL" smtClean="0"/>
-              <a:t>26-09-2024</a:t>
+              <a:t>27-09-2024</a:t>
             </a:fld>
             <a:endParaRPr lang="es-CL"/>
           </a:p>
@@ -2097,7 +2097,7 @@
           <a:p>
             <a:fld id="{1F7D5737-F21B-45FB-B5CD-199FB62EBD15}" type="datetimeFigureOut">
               <a:rPr lang="es-CL" smtClean="0"/>
-              <a:t>26-09-2024</a:t>
+              <a:t>27-09-2024</a:t>
             </a:fld>
             <a:endParaRPr lang="es-CL"/>
           </a:p>
@@ -2567,7 +2567,7 @@
           <a:p>
             <a:fld id="{1F7D5737-F21B-45FB-B5CD-199FB62EBD15}" type="datetimeFigureOut">
               <a:rPr lang="es-CL" smtClean="0"/>
-              <a:t>26-09-2024</a:t>
+              <a:t>27-09-2024</a:t>
             </a:fld>
             <a:endParaRPr lang="es-CL"/>
           </a:p>
@@ -2772,7 +2772,7 @@
           <a:p>
             <a:fld id="{1F7D5737-F21B-45FB-B5CD-199FB62EBD15}" type="datetimeFigureOut">
               <a:rPr lang="es-CL" smtClean="0"/>
-              <a:t>26-09-2024</a:t>
+              <a:t>27-09-2024</a:t>
             </a:fld>
             <a:endParaRPr lang="es-CL"/>
           </a:p>
@@ -2983,7 +2983,7 @@
           <a:p>
             <a:fld id="{1F7D5737-F21B-45FB-B5CD-199FB62EBD15}" type="datetimeFigureOut">
               <a:rPr lang="es-CL" smtClean="0"/>
-              <a:t>26-09-2024</a:t>
+              <a:t>27-09-2024</a:t>
             </a:fld>
             <a:endParaRPr lang="es-CL"/>
           </a:p>
@@ -3215,7 +3215,7 @@
           <a:p>
             <a:fld id="{1F7D5737-F21B-45FB-B5CD-199FB62EBD15}" type="datetimeFigureOut">
               <a:rPr lang="es-CL" smtClean="0"/>
-              <a:t>26-09-2024</a:t>
+              <a:t>27-09-2024</a:t>
             </a:fld>
             <a:endParaRPr lang="es-CL"/>
           </a:p>
@@ -3463,7 +3463,7 @@
           <a:p>
             <a:fld id="{1F7D5737-F21B-45FB-B5CD-199FB62EBD15}" type="datetimeFigureOut">
               <a:rPr lang="es-CL" smtClean="0"/>
-              <a:t>26-09-2024</a:t>
+              <a:t>27-09-2024</a:t>
             </a:fld>
             <a:endParaRPr lang="es-CL"/>
           </a:p>
@@ -3761,7 +3761,7 @@
           <a:p>
             <a:fld id="{1F7D5737-F21B-45FB-B5CD-199FB62EBD15}" type="datetimeFigureOut">
               <a:rPr lang="es-CL" smtClean="0"/>
-              <a:t>26-09-2024</a:t>
+              <a:t>27-09-2024</a:t>
             </a:fld>
             <a:endParaRPr lang="es-CL"/>
           </a:p>
@@ -4155,7 +4155,7 @@
           <a:p>
             <a:fld id="{1F7D5737-F21B-45FB-B5CD-199FB62EBD15}" type="datetimeFigureOut">
               <a:rPr lang="es-CL" smtClean="0"/>
-              <a:t>26-09-2024</a:t>
+              <a:t>27-09-2024</a:t>
             </a:fld>
             <a:endParaRPr lang="es-CL"/>
           </a:p>
@@ -4304,7 +4304,7 @@
           <a:p>
             <a:fld id="{1F7D5737-F21B-45FB-B5CD-199FB62EBD15}" type="datetimeFigureOut">
               <a:rPr lang="es-CL" smtClean="0"/>
-              <a:t>26-09-2024</a:t>
+              <a:t>27-09-2024</a:t>
             </a:fld>
             <a:endParaRPr lang="es-CL"/>
           </a:p>
@@ -4430,7 +4430,7 @@
           <a:p>
             <a:fld id="{1F7D5737-F21B-45FB-B5CD-199FB62EBD15}" type="datetimeFigureOut">
               <a:rPr lang="es-CL" smtClean="0"/>
-              <a:t>26-09-2024</a:t>
+              <a:t>27-09-2024</a:t>
             </a:fld>
             <a:endParaRPr lang="es-CL"/>
           </a:p>
@@ -4685,7 +4685,7 @@
           <a:p>
             <a:fld id="{1F7D5737-F21B-45FB-B5CD-199FB62EBD15}" type="datetimeFigureOut">
               <a:rPr lang="es-CL" smtClean="0"/>
-              <a:t>26-09-2024</a:t>
+              <a:t>27-09-2024</a:t>
             </a:fld>
             <a:endParaRPr lang="es-CL"/>
           </a:p>
@@ -5000,7 +5000,7 @@
           <a:p>
             <a:fld id="{1F7D5737-F21B-45FB-B5CD-199FB62EBD15}" type="datetimeFigureOut">
               <a:rPr lang="es-CL" smtClean="0"/>
-              <a:t>26-09-2024</a:t>
+              <a:t>27-09-2024</a:t>
             </a:fld>
             <a:endParaRPr lang="es-CL"/>
           </a:p>
@@ -5351,7 +5351,7 @@
           <a:p>
             <a:fld id="{1F7D5737-F21B-45FB-B5CD-199FB62EBD15}" type="datetimeFigureOut">
               <a:rPr lang="es-CL" smtClean="0"/>
-              <a:t>26-09-2024</a:t>
+              <a:t>27-09-2024</a:t>
             </a:fld>
             <a:endParaRPr lang="es-CL"/>
           </a:p>

</xml_diff>